<commit_message>
create and update - Apresentação
</commit_message>
<xml_diff>
--- a/Ring Resonator - Apresentação.pptx
+++ b/Ring Resonator - Apresentação.pptx
@@ -16,16 +16,15 @@
     <p:sldId id="277" r:id="rId10"/>
     <p:sldId id="276" r:id="rId11"/>
     <p:sldId id="271" r:id="rId12"/>
-    <p:sldId id="282" r:id="rId13"/>
-    <p:sldId id="283" r:id="rId14"/>
-    <p:sldId id="272" r:id="rId15"/>
-    <p:sldId id="278" r:id="rId16"/>
-    <p:sldId id="279" r:id="rId17"/>
-    <p:sldId id="262" r:id="rId18"/>
-    <p:sldId id="263" r:id="rId19"/>
-    <p:sldId id="281" r:id="rId20"/>
-    <p:sldId id="267" r:id="rId21"/>
-    <p:sldId id="268" r:id="rId22"/>
+    <p:sldId id="283" r:id="rId13"/>
+    <p:sldId id="272" r:id="rId14"/>
+    <p:sldId id="278" r:id="rId15"/>
+    <p:sldId id="279" r:id="rId16"/>
+    <p:sldId id="262" r:id="rId17"/>
+    <p:sldId id="263" r:id="rId18"/>
+    <p:sldId id="281" r:id="rId19"/>
+    <p:sldId id="267" r:id="rId20"/>
+    <p:sldId id="268" r:id="rId21"/>
   </p:sldIdLst>
   <p:sldSz cx="12192000" cy="6858000"/>
   <p:notesSz cx="12192000" cy="6858000"/>
@@ -198,7 +197,7 @@
           <a:p>
             <a:fld id="{1D8BD707-D9CF-40AE-B4C6-C98DA3205C09}" type="datetimeFigureOut">
               <a:rPr lang="en-US"/>
-              <a:t>3/24/2025</a:t>
+              <a:t>3/25/2025</a:t>
             </a:fld>
             <a:endParaRPr lang="en-US"/>
           </a:p>
@@ -369,7 +368,7 @@
           <a:p>
             <a:fld id="{1D8BD707-D9CF-40AE-B4C6-C98DA3205C09}" type="datetimeFigureOut">
               <a:rPr lang="en-US"/>
-              <a:t>3/24/2025</a:t>
+              <a:t>3/25/2025</a:t>
             </a:fld>
             <a:endParaRPr lang="en-US"/>
           </a:p>
@@ -595,7 +594,7 @@
           <a:p>
             <a:fld id="{1D8BD707-D9CF-40AE-B4C6-C98DA3205C09}" type="datetimeFigureOut">
               <a:rPr lang="en-US"/>
-              <a:t>3/24/2025</a:t>
+              <a:t>3/25/2025</a:t>
             </a:fld>
             <a:endParaRPr lang="en-US"/>
           </a:p>
@@ -845,7 +844,7 @@
           <a:p>
             <a:fld id="{1D8BD707-D9CF-40AE-B4C6-C98DA3205C09}" type="datetimeFigureOut">
               <a:rPr lang="en-US"/>
-              <a:t>3/24/2025</a:t>
+              <a:t>3/25/2025</a:t>
             </a:fld>
             <a:endParaRPr lang="en-US"/>
           </a:p>
@@ -964,7 +963,7 @@
           <a:p>
             <a:fld id="{1D8BD707-D9CF-40AE-B4C6-C98DA3205C09}" type="datetimeFigureOut">
               <a:rPr lang="en-US"/>
-              <a:t>3/24/2025</a:t>
+              <a:t>3/25/2025</a:t>
             </a:fld>
             <a:endParaRPr lang="en-US"/>
           </a:p>
@@ -1227,7 +1226,7 @@
           <a:p>
             <a:fld id="{1D8BD707-D9CF-40AE-B4C6-C98DA3205C09}" type="datetimeFigureOut">
               <a:rPr lang="en-US"/>
-              <a:t>3/24/2025</a:t>
+              <a:t>3/25/2025</a:t>
             </a:fld>
             <a:endParaRPr lang="en-US"/>
           </a:p>
@@ -2675,10 +2674,45 @@
           </a:p>
         </p:txBody>
       </p:sp>
+      <p:pic>
+        <p:nvPicPr>
+          <p:cNvPr id="8" name="Imagem 7">
+            <a:extLst>
+              <a:ext uri="{FF2B5EF4-FFF2-40B4-BE49-F238E27FC236}">
+                <a16:creationId xmlns:a16="http://schemas.microsoft.com/office/drawing/2014/main" id="{C2AB520D-F00B-E4AF-2B61-BA19EED30765}"/>
+              </a:ext>
+            </a:extLst>
+          </p:cNvPr>
+          <p:cNvPicPr>
+            <a:picLocks noChangeAspect="1"/>
+          </p:cNvPicPr>
+          <p:nvPr/>
+        </p:nvPicPr>
+        <p:blipFill>
+          <a:blip r:embed="rId5" cstate="print">
+            <a:extLst>
+              <a:ext uri="{28A0092B-C50C-407E-A947-70E740481C1C}">
+                <a14:useLocalDpi xmlns:a14="http://schemas.microsoft.com/office/drawing/2010/main" val="0"/>
+              </a:ext>
+            </a:extLst>
+          </a:blip>
+          <a:srcRect/>
+          <a:stretch/>
+        </p:blipFill>
+        <p:spPr>
+          <a:xfrm>
+            <a:off x="2057400" y="1052056"/>
+            <a:ext cx="7740000" cy="5487135"/>
+          </a:xfrm>
+          <a:prstGeom prst="rect">
+            <a:avLst/>
+          </a:prstGeom>
+        </p:spPr>
+      </p:pic>
     </p:spTree>
     <p:extLst>
       <p:ext uri="{BB962C8B-B14F-4D97-AF65-F5344CB8AC3E}">
-        <p14:creationId xmlns:p14="http://schemas.microsoft.com/office/powerpoint/2010/main" val="788869267"/>
+        <p14:creationId xmlns:p14="http://schemas.microsoft.com/office/powerpoint/2010/main" val="309967945"/>
       </p:ext>
     </p:extLst>
   </p:cSld>
@@ -2708,118 +2742,6 @@
       <p:sp>
         <p:nvSpPr>
           <p:cNvPr id="2" name="object 2"/>
-          <p:cNvSpPr txBox="1"/>
-          <p:nvPr/>
-        </p:nvSpPr>
-        <p:spPr>
-          <a:xfrm>
-            <a:off x="11529441" y="6442354"/>
-            <a:ext cx="125095" cy="193675"/>
-          </a:xfrm>
-          <a:prstGeom prst="rect">
-            <a:avLst/>
-          </a:prstGeom>
-        </p:spPr>
-        <p:txBody>
-          <a:bodyPr vert="horz" wrap="square" lIns="0" tIns="12700" rIns="0" bIns="0" rtlCol="0">
-            <a:spAutoFit/>
-          </a:bodyPr>
-          <a:lstStyle/>
-          <a:p>
-            <a:pPr marL="12700">
-              <a:lnSpc>
-                <a:spcPct val="100000"/>
-              </a:lnSpc>
-              <a:spcBef>
-                <a:spcPts val="100"/>
-              </a:spcBef>
-            </a:pPr>
-            <a:r>
-              <a:rPr sz="1100" b="1" spc="-50" dirty="0">
-                <a:solidFill>
-                  <a:srgbClr val="C5C5C5"/>
-                </a:solidFill>
-                <a:latin typeface="Verdana"/>
-                <a:cs typeface="Verdana"/>
-              </a:rPr>
-              <a:t>1</a:t>
-            </a:r>
-            <a:endParaRPr sz="1100">
-              <a:latin typeface="Verdana"/>
-              <a:cs typeface="Verdana"/>
-            </a:endParaRPr>
-          </a:p>
-        </p:txBody>
-      </p:sp>
-      <p:pic>
-        <p:nvPicPr>
-          <p:cNvPr id="3" name="object 3"/>
-          <p:cNvPicPr/>
-          <p:nvPr/>
-        </p:nvPicPr>
-        <p:blipFill>
-          <a:blip r:embed="rId2" cstate="print"/>
-          <a:stretch>
-            <a:fillRect/>
-          </a:stretch>
-        </p:blipFill>
-        <p:spPr>
-          <a:xfrm>
-            <a:off x="0" y="0"/>
-            <a:ext cx="126490" cy="6857995"/>
-          </a:xfrm>
-          <a:prstGeom prst="rect">
-            <a:avLst/>
-          </a:prstGeom>
-        </p:spPr>
-      </p:pic>
-      <p:pic>
-        <p:nvPicPr>
-          <p:cNvPr id="4" name="object 4"/>
-          <p:cNvPicPr/>
-          <p:nvPr/>
-        </p:nvPicPr>
-        <p:blipFill>
-          <a:blip r:embed="rId3" cstate="print"/>
-          <a:stretch>
-            <a:fillRect/>
-          </a:stretch>
-        </p:blipFill>
-        <p:spPr>
-          <a:xfrm>
-            <a:off x="9413367" y="482345"/>
-            <a:ext cx="1680336" cy="249682"/>
-          </a:xfrm>
-          <a:prstGeom prst="rect">
-            <a:avLst/>
-          </a:prstGeom>
-        </p:spPr>
-      </p:pic>
-      <p:pic>
-        <p:nvPicPr>
-          <p:cNvPr id="5" name="object 5"/>
-          <p:cNvPicPr/>
-          <p:nvPr/>
-        </p:nvPicPr>
-        <p:blipFill>
-          <a:blip r:embed="rId4" cstate="print"/>
-          <a:stretch>
-            <a:fillRect/>
-          </a:stretch>
-        </p:blipFill>
-        <p:spPr>
-          <a:xfrm>
-            <a:off x="11338306" y="421652"/>
-            <a:ext cx="425742" cy="337172"/>
-          </a:xfrm>
-          <a:prstGeom prst="rect">
-            <a:avLst/>
-          </a:prstGeom>
-        </p:spPr>
-      </p:pic>
-      <p:sp>
-        <p:nvSpPr>
-          <p:cNvPr id="6" name="object 6"/>
           <p:cNvSpPr txBox="1">
             <a:spLocks noGrp="1"/>
           </p:cNvSpPr>
@@ -2828,10 +2750,6 @@
           </p:nvPr>
         </p:nvSpPr>
         <p:spPr>
-          <a:xfrm>
-            <a:off x="439013" y="424942"/>
-            <a:ext cx="1646555" cy="360680"/>
-          </a:xfrm>
           <a:prstGeom prst="rect">
             <a:avLst/>
           </a:prstGeom>
@@ -2851,20 +2769,174 @@
               </a:spcBef>
             </a:pPr>
             <a:r>
-              <a:rPr spc="-10" dirty="0">
+              <a:rPr dirty="0">
                 <a:solidFill>
                   <a:srgbClr val="222C66"/>
                 </a:solidFill>
               </a:rPr>
-              <a:t>Geometria</a:t>
-            </a:r>
+              <a:t>2.1</a:t>
+            </a:r>
+            <a:r>
+              <a:rPr spc="-95" dirty="0">
+                <a:solidFill>
+                  <a:srgbClr val="222C66"/>
+                </a:solidFill>
+              </a:rPr>
+              <a:t> </a:t>
+            </a:r>
+            <a:r>
+              <a:rPr dirty="0"/>
+              <a:t>Transmissão</a:t>
+            </a:r>
+            <a:r>
+              <a:rPr spc="-95" dirty="0"/>
+              <a:t> </a:t>
+            </a:r>
+            <a:r>
+              <a:rPr dirty="0"/>
+              <a:t>x</a:t>
+            </a:r>
+            <a:r>
+              <a:rPr spc="-75" dirty="0"/>
+              <a:t> </a:t>
+            </a:r>
+            <a:r>
+              <a:rPr dirty="0"/>
+              <a:t>Comprimento</a:t>
+            </a:r>
+            <a:r>
+              <a:rPr spc="-80" dirty="0"/>
+              <a:t> </a:t>
+            </a:r>
+            <a:r>
+              <a:rPr dirty="0"/>
+              <a:t>de</a:t>
+            </a:r>
+            <a:r>
+              <a:rPr spc="-90" dirty="0"/>
+              <a:t> </a:t>
+            </a:r>
+            <a:r>
+              <a:rPr spc="-20" dirty="0"/>
+              <a:t>onda</a:t>
+            </a:r>
+          </a:p>
+        </p:txBody>
+      </p:sp>
+      <p:pic>
+        <p:nvPicPr>
+          <p:cNvPr id="16" name="object 16"/>
+          <p:cNvPicPr>
+            <a:picLocks noChangeAspect="1"/>
+          </p:cNvPicPr>
+          <p:nvPr/>
+        </p:nvPicPr>
+        <p:blipFill>
+          <a:blip r:embed="rId2">
+            <a:extLst>
+              <a:ext uri="{28A0092B-C50C-407E-A947-70E740481C1C}">
+                <a14:useLocalDpi xmlns:a14="http://schemas.microsoft.com/office/drawing/2010/main" val="0"/>
+              </a:ext>
+            </a:extLst>
+          </a:blip>
+          <a:srcRect/>
+          <a:stretch/>
+        </p:blipFill>
+        <p:spPr>
+          <a:xfrm>
+            <a:off x="473213" y="1357182"/>
+            <a:ext cx="8640000" cy="4276363"/>
+          </a:xfrm>
+          <a:prstGeom prst="rect">
+            <a:avLst/>
+          </a:prstGeom>
+        </p:spPr>
+      </p:pic>
+      <p:sp>
+        <p:nvSpPr>
+          <p:cNvPr id="18" name="object 18"/>
+          <p:cNvSpPr txBox="1"/>
+          <p:nvPr/>
+        </p:nvSpPr>
+        <p:spPr>
+          <a:xfrm>
+            <a:off x="9144000" y="2895600"/>
+            <a:ext cx="2641600" cy="1077595"/>
+          </a:xfrm>
+          <a:prstGeom prst="rect">
+            <a:avLst/>
+          </a:prstGeom>
+          <a:ln w="38100">
+            <a:solidFill>
+              <a:srgbClr val="17375E"/>
+            </a:solidFill>
+          </a:ln>
+        </p:spPr>
+        <p:txBody>
+          <a:bodyPr vert="horz" wrap="square" lIns="0" tIns="43815" rIns="0" bIns="0" rtlCol="0">
+            <a:spAutoFit/>
+          </a:bodyPr>
+          <a:lstStyle/>
+          <a:p>
+            <a:pPr marL="229870" marR="93345" indent="-121920">
+              <a:lnSpc>
+                <a:spcPct val="100000"/>
+              </a:lnSpc>
+              <a:spcBef>
+                <a:spcPts val="345"/>
+              </a:spcBef>
+            </a:pPr>
+            <a:r>
+              <a:rPr sz="3200" spc="-10" dirty="0">
+                <a:solidFill>
+                  <a:srgbClr val="17375E"/>
+                </a:solidFill>
+                <a:latin typeface="Verdana"/>
+                <a:cs typeface="Verdana"/>
+              </a:rPr>
+              <a:t>Dispositivos </a:t>
+            </a:r>
+            <a:r>
+              <a:rPr sz="3200" dirty="0">
+                <a:solidFill>
+                  <a:srgbClr val="17375E"/>
+                </a:solidFill>
+                <a:latin typeface="Verdana"/>
+                <a:cs typeface="Verdana"/>
+              </a:rPr>
+              <a:t>PDK</a:t>
+            </a:r>
+            <a:r>
+              <a:rPr sz="3200" spc="-20" dirty="0">
+                <a:solidFill>
+                  <a:srgbClr val="17375E"/>
+                </a:solidFill>
+                <a:latin typeface="Verdana"/>
+                <a:cs typeface="Verdana"/>
+              </a:rPr>
+              <a:t> </a:t>
+            </a:r>
+            <a:r>
+              <a:rPr sz="3200" spc="-10" dirty="0">
+                <a:solidFill>
+                  <a:srgbClr val="17375E"/>
+                </a:solidFill>
+                <a:latin typeface="Verdana"/>
+                <a:cs typeface="Verdana"/>
+              </a:rPr>
+              <a:t>SiePic</a:t>
+            </a:r>
+            <a:endParaRPr sz="3200" dirty="0">
+              <a:latin typeface="Verdana"/>
+              <a:cs typeface="Verdana"/>
+            </a:endParaRPr>
           </a:p>
         </p:txBody>
       </p:sp>
     </p:spTree>
     <p:extLst>
       <p:ext uri="{BB962C8B-B14F-4D97-AF65-F5344CB8AC3E}">
-        <p14:creationId xmlns:p14="http://schemas.microsoft.com/office/powerpoint/2010/main" val="309967945"/>
+        <p14:creationId xmlns:p14="http://schemas.microsoft.com/office/powerpoint/2010/main" val="2094126164"/>
       </p:ext>
     </p:extLst>
   </p:cSld>
@@ -3088,7 +3160,7 @@
     </p:spTree>
     <p:extLst>
       <p:ext uri="{BB962C8B-B14F-4D97-AF65-F5344CB8AC3E}">
-        <p14:creationId xmlns:p14="http://schemas.microsoft.com/office/powerpoint/2010/main" val="2094126164"/>
+        <p14:creationId xmlns:p14="http://schemas.microsoft.com/office/powerpoint/2010/main" val="2715190005"/>
       </p:ext>
     </p:extLst>
   </p:cSld>
@@ -3220,8 +3292,8 @@
         </p:blipFill>
         <p:spPr>
           <a:xfrm>
-            <a:off x="473213" y="1357182"/>
-            <a:ext cx="8640000" cy="4276363"/>
+            <a:off x="473213" y="1355020"/>
+            <a:ext cx="8640000" cy="4280687"/>
           </a:xfrm>
           <a:prstGeom prst="rect">
             <a:avLst/>
@@ -3312,7 +3384,7 @@
     </p:spTree>
     <p:extLst>
       <p:ext uri="{BB962C8B-B14F-4D97-AF65-F5344CB8AC3E}">
-        <p14:creationId xmlns:p14="http://schemas.microsoft.com/office/powerpoint/2010/main" val="2715190005"/>
+        <p14:creationId xmlns:p14="http://schemas.microsoft.com/office/powerpoint/2010/main" val="3312354376"/>
       </p:ext>
     </p:extLst>
   </p:cSld>
@@ -3350,12 +3422,16 @@
           </p:nvPr>
         </p:nvSpPr>
         <p:spPr>
+          <a:xfrm>
+            <a:off x="2799333" y="3143504"/>
+            <a:ext cx="5832475" cy="574040"/>
+          </a:xfrm>
           <a:prstGeom prst="rect">
             <a:avLst/>
           </a:prstGeom>
         </p:spPr>
         <p:txBody>
-          <a:bodyPr vert="horz" wrap="square" lIns="0" tIns="12065" rIns="0" bIns="0" rtlCol="0">
+          <a:bodyPr vert="horz" wrap="square" lIns="0" tIns="12700" rIns="0" bIns="0" rtlCol="0">
             <a:spAutoFit/>
           </a:bodyPr>
           <a:lstStyle/>
@@ -3365,180 +3441,70 @@
                 <a:spcPct val="100000"/>
               </a:lnSpc>
               <a:spcBef>
-                <a:spcPts val="95"/>
+                <a:spcPts val="100"/>
               </a:spcBef>
             </a:pPr>
             <a:r>
-              <a:rPr dirty="0">
-                <a:solidFill>
-                  <a:srgbClr val="222C66"/>
-                </a:solidFill>
-              </a:rPr>
-              <a:t>2.1</a:t>
-            </a:r>
-            <a:r>
-              <a:rPr spc="-95" dirty="0">
-                <a:solidFill>
-                  <a:srgbClr val="222C66"/>
-                </a:solidFill>
-              </a:rPr>
-              <a:t> </a:t>
-            </a:r>
-            <a:r>
-              <a:rPr dirty="0"/>
-              <a:t>Transmissão</a:t>
-            </a:r>
-            <a:r>
-              <a:rPr spc="-95" dirty="0"/>
-              <a:t> </a:t>
-            </a:r>
-            <a:r>
-              <a:rPr dirty="0"/>
-              <a:t>x</a:t>
-            </a:r>
-            <a:r>
-              <a:rPr spc="-75" dirty="0"/>
-              <a:t> </a:t>
-            </a:r>
-            <a:r>
-              <a:rPr dirty="0"/>
-              <a:t>Comprimento</a:t>
-            </a:r>
-            <a:r>
-              <a:rPr spc="-80" dirty="0"/>
-              <a:t> </a:t>
-            </a:r>
-            <a:r>
-              <a:rPr dirty="0"/>
-              <a:t>de</a:t>
-            </a:r>
-            <a:r>
-              <a:rPr spc="-90" dirty="0"/>
-              <a:t> </a:t>
-            </a:r>
-            <a:r>
-              <a:rPr spc="-20" dirty="0"/>
-              <a:t>onda</a:t>
-            </a:r>
-          </a:p>
-        </p:txBody>
-      </p:sp>
-      <p:pic>
-        <p:nvPicPr>
-          <p:cNvPr id="16" name="object 16"/>
-          <p:cNvPicPr>
-            <a:picLocks noChangeAspect="1"/>
-          </p:cNvPicPr>
-          <p:nvPr/>
-        </p:nvPicPr>
-        <p:blipFill>
-          <a:blip r:embed="rId2">
-            <a:extLst>
-              <a:ext uri="{28A0092B-C50C-407E-A947-70E740481C1C}">
-                <a14:useLocalDpi xmlns:a14="http://schemas.microsoft.com/office/drawing/2010/main" val="0"/>
-              </a:ext>
-            </a:extLst>
-          </a:blip>
-          <a:srcRect/>
-          <a:stretch/>
-        </p:blipFill>
-        <p:spPr>
-          <a:xfrm>
-            <a:off x="473213" y="1355020"/>
-            <a:ext cx="8640000" cy="4280687"/>
-          </a:xfrm>
-          <a:prstGeom prst="rect">
-            <a:avLst/>
-          </a:prstGeom>
-        </p:spPr>
-      </p:pic>
-      <p:sp>
-        <p:nvSpPr>
-          <p:cNvPr id="18" name="object 18"/>
-          <p:cNvSpPr txBox="1"/>
-          <p:nvPr/>
-        </p:nvSpPr>
-        <p:spPr>
-          <a:xfrm>
-            <a:off x="9144000" y="2895600"/>
-            <a:ext cx="2641600" cy="1077595"/>
-          </a:xfrm>
-          <a:prstGeom prst="rect">
-            <a:avLst/>
-          </a:prstGeom>
-          <a:ln w="38100">
-            <a:solidFill>
-              <a:srgbClr val="17375E"/>
-            </a:solidFill>
-          </a:ln>
-        </p:spPr>
-        <p:txBody>
-          <a:bodyPr vert="horz" wrap="square" lIns="0" tIns="43815" rIns="0" bIns="0" rtlCol="0">
-            <a:spAutoFit/>
-          </a:bodyPr>
-          <a:lstStyle/>
-          <a:p>
-            <a:pPr marL="229870" marR="93345" indent="-121920">
-              <a:lnSpc>
-                <a:spcPct val="100000"/>
-              </a:lnSpc>
-              <a:spcBef>
-                <a:spcPts val="345"/>
-              </a:spcBef>
-            </a:pPr>
-            <a:r>
-              <a:rPr sz="3200" spc="-10" dirty="0">
-                <a:solidFill>
-                  <a:srgbClr val="17375E"/>
-                </a:solidFill>
-                <a:latin typeface="Verdana"/>
-                <a:cs typeface="Verdana"/>
-              </a:rPr>
-              <a:t>Dispositivos </a:t>
-            </a:r>
-            <a:r>
-              <a:rPr sz="3200" dirty="0">
-                <a:solidFill>
-                  <a:srgbClr val="17375E"/>
-                </a:solidFill>
-                <a:latin typeface="Verdana"/>
-                <a:cs typeface="Verdana"/>
-              </a:rPr>
-              <a:t>PDK</a:t>
-            </a:r>
-            <a:r>
-              <a:rPr sz="3200" spc="-20" dirty="0">
-                <a:solidFill>
-                  <a:srgbClr val="17375E"/>
-                </a:solidFill>
-                <a:latin typeface="Verdana"/>
-                <a:cs typeface="Verdana"/>
-              </a:rPr>
-              <a:t> </a:t>
-            </a:r>
-            <a:r>
-              <a:rPr sz="3200" spc="-10" dirty="0">
-                <a:solidFill>
-                  <a:srgbClr val="17375E"/>
-                </a:solidFill>
-                <a:latin typeface="Verdana"/>
-                <a:cs typeface="Verdana"/>
-              </a:rPr>
-              <a:t>SiePic</a:t>
-            </a:r>
-            <a:endParaRPr sz="3200" dirty="0">
-              <a:latin typeface="Verdana"/>
-              <a:cs typeface="Verdana"/>
-            </a:endParaRPr>
+              <a:rPr sz="3600" dirty="0">
+                <a:solidFill>
+                  <a:srgbClr val="0E2777"/>
+                </a:solidFill>
+              </a:rPr>
+              <a:t>2.</a:t>
+            </a:r>
+            <a:r>
+              <a:rPr sz="3600" spc="-60" dirty="0">
+                <a:solidFill>
+                  <a:srgbClr val="0E2777"/>
+                </a:solidFill>
+              </a:rPr>
+              <a:t> </a:t>
+            </a:r>
+            <a:r>
+              <a:rPr sz="3600" dirty="0">
+                <a:solidFill>
+                  <a:srgbClr val="0E2777"/>
+                </a:solidFill>
+              </a:rPr>
+              <a:t>Free</a:t>
+            </a:r>
+            <a:r>
+              <a:rPr sz="3600" spc="-40" dirty="0">
+                <a:solidFill>
+                  <a:srgbClr val="0E2777"/>
+                </a:solidFill>
+              </a:rPr>
+              <a:t> </a:t>
+            </a:r>
+            <a:r>
+              <a:rPr sz="3600" dirty="0">
+                <a:solidFill>
+                  <a:srgbClr val="0E2777"/>
+                </a:solidFill>
+              </a:rPr>
+              <a:t>Spectral</a:t>
+            </a:r>
+            <a:r>
+              <a:rPr sz="3600" spc="-45" dirty="0">
+                <a:solidFill>
+                  <a:srgbClr val="0E2777"/>
+                </a:solidFill>
+              </a:rPr>
+              <a:t> </a:t>
+            </a:r>
+            <a:r>
+              <a:rPr sz="3600" spc="-10" dirty="0">
+                <a:solidFill>
+                  <a:srgbClr val="0E2777"/>
+                </a:solidFill>
+              </a:rPr>
+              <a:t>Range</a:t>
+            </a:r>
+            <a:endParaRPr sz="3600"/>
           </a:p>
         </p:txBody>
       </p:sp>
     </p:spTree>
-    <p:extLst>
-      <p:ext uri="{BB962C8B-B14F-4D97-AF65-F5344CB8AC3E}">
-        <p14:creationId xmlns:p14="http://schemas.microsoft.com/office/powerpoint/2010/main" val="3312354376"/>
-      </p:ext>
-    </p:extLst>
   </p:cSld>
   <p:clrMapOvr>
     <a:masterClrMapping/>
@@ -3574,124 +3540,6 @@
           </p:nvPr>
         </p:nvSpPr>
         <p:spPr>
-          <a:xfrm>
-            <a:off x="2799333" y="3143504"/>
-            <a:ext cx="5832475" cy="574040"/>
-          </a:xfrm>
-          <a:prstGeom prst="rect">
-            <a:avLst/>
-          </a:prstGeom>
-        </p:spPr>
-        <p:txBody>
-          <a:bodyPr vert="horz" wrap="square" lIns="0" tIns="12700" rIns="0" bIns="0" rtlCol="0">
-            <a:spAutoFit/>
-          </a:bodyPr>
-          <a:lstStyle/>
-          <a:p>
-            <a:pPr marL="12700">
-              <a:lnSpc>
-                <a:spcPct val="100000"/>
-              </a:lnSpc>
-              <a:spcBef>
-                <a:spcPts val="100"/>
-              </a:spcBef>
-            </a:pPr>
-            <a:r>
-              <a:rPr sz="3600" dirty="0">
-                <a:solidFill>
-                  <a:srgbClr val="0E2777"/>
-                </a:solidFill>
-              </a:rPr>
-              <a:t>2.</a:t>
-            </a:r>
-            <a:r>
-              <a:rPr sz="3600" spc="-60" dirty="0">
-                <a:solidFill>
-                  <a:srgbClr val="0E2777"/>
-                </a:solidFill>
-              </a:rPr>
-              <a:t> </a:t>
-            </a:r>
-            <a:r>
-              <a:rPr sz="3600" dirty="0">
-                <a:solidFill>
-                  <a:srgbClr val="0E2777"/>
-                </a:solidFill>
-              </a:rPr>
-              <a:t>Free</a:t>
-            </a:r>
-            <a:r>
-              <a:rPr sz="3600" spc="-40" dirty="0">
-                <a:solidFill>
-                  <a:srgbClr val="0E2777"/>
-                </a:solidFill>
-              </a:rPr>
-              <a:t> </a:t>
-            </a:r>
-            <a:r>
-              <a:rPr sz="3600" dirty="0">
-                <a:solidFill>
-                  <a:srgbClr val="0E2777"/>
-                </a:solidFill>
-              </a:rPr>
-              <a:t>Spectral</a:t>
-            </a:r>
-            <a:r>
-              <a:rPr sz="3600" spc="-45" dirty="0">
-                <a:solidFill>
-                  <a:srgbClr val="0E2777"/>
-                </a:solidFill>
-              </a:rPr>
-              <a:t> </a:t>
-            </a:r>
-            <a:r>
-              <a:rPr sz="3600" spc="-10" dirty="0">
-                <a:solidFill>
-                  <a:srgbClr val="0E2777"/>
-                </a:solidFill>
-              </a:rPr>
-              <a:t>Range</a:t>
-            </a:r>
-            <a:endParaRPr sz="3600"/>
-          </a:p>
-        </p:txBody>
-      </p:sp>
-    </p:spTree>
-  </p:cSld>
-  <p:clrMapOvr>
-    <a:masterClrMapping/>
-  </p:clrMapOvr>
-</p:sld>
-</file>
-
-<file path=ppt/slides/slide18.xml><?xml version="1.0" encoding="utf-8"?>
-<p:sld xmlns:a="http://schemas.openxmlformats.org/drawingml/2006/main" xmlns:r="http://schemas.openxmlformats.org/officeDocument/2006/relationships" xmlns:p="http://schemas.openxmlformats.org/presentationml/2006/main">
-  <p:cSld>
-    <p:spTree>
-      <p:nvGrpSpPr>
-        <p:cNvPr id="1" name=""/>
-        <p:cNvGrpSpPr/>
-        <p:nvPr/>
-      </p:nvGrpSpPr>
-      <p:grpSpPr>
-        <a:xfrm>
-          <a:off x="0" y="0"/>
-          <a:ext cx="0" cy="0"/>
-          <a:chOff x="0" y="0"/>
-          <a:chExt cx="0" cy="0"/>
-        </a:xfrm>
-      </p:grpSpPr>
-      <p:sp>
-        <p:nvSpPr>
-          <p:cNvPr id="2" name="object 2"/>
-          <p:cNvSpPr txBox="1">
-            <a:spLocks noGrp="1"/>
-          </p:cNvSpPr>
-          <p:nvPr>
-            <p:ph type="title"/>
-          </p:nvPr>
-        </p:nvSpPr>
-        <p:spPr>
           <a:prstGeom prst="rect">
             <a:avLst/>
           </a:prstGeom>
@@ -3851,7 +3699,7 @@
 </p:sld>
 </file>
 
-<file path=ppt/slides/slide19.xml><?xml version="1.0" encoding="utf-8"?>
+<file path=ppt/slides/slide18.xml><?xml version="1.0" encoding="utf-8"?>
 <p:sld xmlns:a="http://schemas.openxmlformats.org/drawingml/2006/main" xmlns:r="http://schemas.openxmlformats.org/officeDocument/2006/relationships" xmlns:p="http://schemas.openxmlformats.org/presentationml/2006/main">
   <p:cSld>
     <p:spTree>
@@ -4744,6 +4592,223 @@
 </p:sld>
 </file>
 
+<file path=ppt/slides/slide19.xml><?xml version="1.0" encoding="utf-8"?>
+<p:sld xmlns:a="http://schemas.openxmlformats.org/drawingml/2006/main" xmlns:r="http://schemas.openxmlformats.org/officeDocument/2006/relationships" xmlns:p="http://schemas.openxmlformats.org/presentationml/2006/main">
+  <p:cSld>
+    <p:spTree>
+      <p:nvGrpSpPr>
+        <p:cNvPr id="1" name=""/>
+        <p:cNvGrpSpPr/>
+        <p:nvPr/>
+      </p:nvGrpSpPr>
+      <p:grpSpPr>
+        <a:xfrm>
+          <a:off x="0" y="0"/>
+          <a:ext cx="0" cy="0"/>
+          <a:chOff x="0" y="0"/>
+          <a:chExt cx="0" cy="0"/>
+        </a:xfrm>
+      </p:grpSpPr>
+      <p:sp>
+        <p:nvSpPr>
+          <p:cNvPr id="2" name="object 2"/>
+          <p:cNvSpPr txBox="1">
+            <a:spLocks noGrp="1"/>
+          </p:cNvSpPr>
+          <p:nvPr>
+            <p:ph type="title"/>
+          </p:nvPr>
+        </p:nvSpPr>
+        <p:spPr>
+          <a:prstGeom prst="rect">
+            <a:avLst/>
+          </a:prstGeom>
+        </p:spPr>
+        <p:txBody>
+          <a:bodyPr vert="horz" wrap="square" lIns="0" tIns="12065" rIns="0" bIns="0" rtlCol="0">
+            <a:spAutoFit/>
+          </a:bodyPr>
+          <a:lstStyle/>
+          <a:p>
+            <a:pPr marL="12700">
+              <a:lnSpc>
+                <a:spcPct val="100000"/>
+              </a:lnSpc>
+              <a:spcBef>
+                <a:spcPts val="95"/>
+              </a:spcBef>
+            </a:pPr>
+            <a:r>
+              <a:rPr dirty="0">
+                <a:solidFill>
+                  <a:srgbClr val="222C66"/>
+                </a:solidFill>
+              </a:rPr>
+              <a:t>2.1</a:t>
+            </a:r>
+            <a:r>
+              <a:rPr spc="-70" dirty="0">
+                <a:solidFill>
+                  <a:srgbClr val="222C66"/>
+                </a:solidFill>
+              </a:rPr>
+              <a:t> </a:t>
+            </a:r>
+            <a:r>
+              <a:rPr dirty="0"/>
+              <a:t>FSR</a:t>
+            </a:r>
+            <a:r>
+              <a:rPr spc="-65" dirty="0"/>
+              <a:t> </a:t>
+            </a:r>
+            <a:r>
+              <a:rPr dirty="0"/>
+              <a:t>x</a:t>
+            </a:r>
+            <a:r>
+              <a:rPr spc="-55" dirty="0"/>
+              <a:t> </a:t>
+            </a:r>
+            <a:r>
+              <a:rPr dirty="0"/>
+              <a:t>Comprimento</a:t>
+            </a:r>
+            <a:r>
+              <a:rPr spc="-60" dirty="0"/>
+              <a:t> </a:t>
+            </a:r>
+            <a:r>
+              <a:rPr dirty="0"/>
+              <a:t>de</a:t>
+            </a:r>
+            <a:r>
+              <a:rPr spc="-65" dirty="0"/>
+              <a:t> </a:t>
+            </a:r>
+            <a:r>
+              <a:rPr spc="-20" dirty="0"/>
+              <a:t>onda</a:t>
+            </a:r>
+          </a:p>
+        </p:txBody>
+      </p:sp>
+      <p:sp>
+        <p:nvSpPr>
+          <p:cNvPr id="3" name="object 3"/>
+          <p:cNvSpPr txBox="1"/>
+          <p:nvPr/>
+        </p:nvSpPr>
+        <p:spPr>
+          <a:xfrm>
+            <a:off x="9144000" y="3191382"/>
+            <a:ext cx="2641600" cy="1077595"/>
+          </a:xfrm>
+          <a:prstGeom prst="rect">
+            <a:avLst/>
+          </a:prstGeom>
+          <a:ln w="38100">
+            <a:solidFill>
+              <a:srgbClr val="17375E"/>
+            </a:solidFill>
+          </a:ln>
+        </p:spPr>
+        <p:txBody>
+          <a:bodyPr vert="horz" wrap="square" lIns="0" tIns="43815" rIns="0" bIns="0" rtlCol="0">
+            <a:spAutoFit/>
+          </a:bodyPr>
+          <a:lstStyle/>
+          <a:p>
+            <a:pPr marL="229870" marR="93345" indent="-121920">
+              <a:lnSpc>
+                <a:spcPct val="100000"/>
+              </a:lnSpc>
+              <a:spcBef>
+                <a:spcPts val="345"/>
+              </a:spcBef>
+            </a:pPr>
+            <a:r>
+              <a:rPr sz="3200" spc="-10" dirty="0">
+                <a:solidFill>
+                  <a:srgbClr val="17375E"/>
+                </a:solidFill>
+                <a:latin typeface="Verdana"/>
+                <a:cs typeface="Verdana"/>
+              </a:rPr>
+              <a:t>Dispositivos </a:t>
+            </a:r>
+            <a:r>
+              <a:rPr sz="3200" dirty="0">
+                <a:solidFill>
+                  <a:srgbClr val="17375E"/>
+                </a:solidFill>
+                <a:latin typeface="Verdana"/>
+                <a:cs typeface="Verdana"/>
+              </a:rPr>
+              <a:t>PDK</a:t>
+            </a:r>
+            <a:r>
+              <a:rPr sz="3200" spc="-20" dirty="0">
+                <a:solidFill>
+                  <a:srgbClr val="17375E"/>
+                </a:solidFill>
+                <a:latin typeface="Verdana"/>
+                <a:cs typeface="Verdana"/>
+              </a:rPr>
+              <a:t> </a:t>
+            </a:r>
+            <a:r>
+              <a:rPr sz="3200" spc="-10" dirty="0">
+                <a:solidFill>
+                  <a:srgbClr val="17375E"/>
+                </a:solidFill>
+                <a:latin typeface="Verdana"/>
+                <a:cs typeface="Verdana"/>
+              </a:rPr>
+              <a:t>SiePic</a:t>
+            </a:r>
+            <a:endParaRPr sz="3200">
+              <a:latin typeface="Verdana"/>
+              <a:cs typeface="Verdana"/>
+            </a:endParaRPr>
+          </a:p>
+        </p:txBody>
+      </p:sp>
+      <p:pic>
+        <p:nvPicPr>
+          <p:cNvPr id="4" name="object 4"/>
+          <p:cNvPicPr/>
+          <p:nvPr/>
+        </p:nvPicPr>
+        <p:blipFill>
+          <a:blip r:embed="rId2">
+            <a:extLst>
+              <a:ext uri="{28A0092B-C50C-407E-A947-70E740481C1C}">
+                <a14:useLocalDpi xmlns:a14="http://schemas.microsoft.com/office/drawing/2010/main" val="0"/>
+              </a:ext>
+            </a:extLst>
+          </a:blip>
+          <a:srcRect/>
+          <a:stretch/>
+        </p:blipFill>
+        <p:spPr>
+          <a:xfrm>
+            <a:off x="1320783" y="1737027"/>
+            <a:ext cx="6830044" cy="3383945"/>
+          </a:xfrm>
+          <a:prstGeom prst="rect">
+            <a:avLst/>
+          </a:prstGeom>
+        </p:spPr>
+      </p:pic>
+    </p:spTree>
+  </p:cSld>
+  <p:clrMapOvr>
+    <a:masterClrMapping/>
+  </p:clrMapOvr>
+</p:sld>
+</file>
+
 <file path=ppt/slides/slide2.xml><?xml version="1.0" encoding="utf-8"?>
 <p:sld xmlns:a="http://schemas.openxmlformats.org/drawingml/2006/main" xmlns:r="http://schemas.openxmlformats.org/officeDocument/2006/relationships" xmlns:p="http://schemas.openxmlformats.org/presentationml/2006/main" showMasterSp="0">
   <p:cSld>
@@ -5948,223 +6013,6 @@
 </file>
 
 <file path=ppt/slides/slide20.xml><?xml version="1.0" encoding="utf-8"?>
-<p:sld xmlns:a="http://schemas.openxmlformats.org/drawingml/2006/main" xmlns:r="http://schemas.openxmlformats.org/officeDocument/2006/relationships" xmlns:p="http://schemas.openxmlformats.org/presentationml/2006/main">
-  <p:cSld>
-    <p:spTree>
-      <p:nvGrpSpPr>
-        <p:cNvPr id="1" name=""/>
-        <p:cNvGrpSpPr/>
-        <p:nvPr/>
-      </p:nvGrpSpPr>
-      <p:grpSpPr>
-        <a:xfrm>
-          <a:off x="0" y="0"/>
-          <a:ext cx="0" cy="0"/>
-          <a:chOff x="0" y="0"/>
-          <a:chExt cx="0" cy="0"/>
-        </a:xfrm>
-      </p:grpSpPr>
-      <p:sp>
-        <p:nvSpPr>
-          <p:cNvPr id="2" name="object 2"/>
-          <p:cNvSpPr txBox="1">
-            <a:spLocks noGrp="1"/>
-          </p:cNvSpPr>
-          <p:nvPr>
-            <p:ph type="title"/>
-          </p:nvPr>
-        </p:nvSpPr>
-        <p:spPr>
-          <a:prstGeom prst="rect">
-            <a:avLst/>
-          </a:prstGeom>
-        </p:spPr>
-        <p:txBody>
-          <a:bodyPr vert="horz" wrap="square" lIns="0" tIns="12065" rIns="0" bIns="0" rtlCol="0">
-            <a:spAutoFit/>
-          </a:bodyPr>
-          <a:lstStyle/>
-          <a:p>
-            <a:pPr marL="12700">
-              <a:lnSpc>
-                <a:spcPct val="100000"/>
-              </a:lnSpc>
-              <a:spcBef>
-                <a:spcPts val="95"/>
-              </a:spcBef>
-            </a:pPr>
-            <a:r>
-              <a:rPr dirty="0">
-                <a:solidFill>
-                  <a:srgbClr val="222C66"/>
-                </a:solidFill>
-              </a:rPr>
-              <a:t>2.1</a:t>
-            </a:r>
-            <a:r>
-              <a:rPr spc="-70" dirty="0">
-                <a:solidFill>
-                  <a:srgbClr val="222C66"/>
-                </a:solidFill>
-              </a:rPr>
-              <a:t> </a:t>
-            </a:r>
-            <a:r>
-              <a:rPr dirty="0"/>
-              <a:t>FSR</a:t>
-            </a:r>
-            <a:r>
-              <a:rPr spc="-65" dirty="0"/>
-              <a:t> </a:t>
-            </a:r>
-            <a:r>
-              <a:rPr dirty="0"/>
-              <a:t>x</a:t>
-            </a:r>
-            <a:r>
-              <a:rPr spc="-55" dirty="0"/>
-              <a:t> </a:t>
-            </a:r>
-            <a:r>
-              <a:rPr dirty="0"/>
-              <a:t>Comprimento</a:t>
-            </a:r>
-            <a:r>
-              <a:rPr spc="-60" dirty="0"/>
-              <a:t> </a:t>
-            </a:r>
-            <a:r>
-              <a:rPr dirty="0"/>
-              <a:t>de</a:t>
-            </a:r>
-            <a:r>
-              <a:rPr spc="-65" dirty="0"/>
-              <a:t> </a:t>
-            </a:r>
-            <a:r>
-              <a:rPr spc="-20" dirty="0"/>
-              <a:t>onda</a:t>
-            </a:r>
-          </a:p>
-        </p:txBody>
-      </p:sp>
-      <p:sp>
-        <p:nvSpPr>
-          <p:cNvPr id="3" name="object 3"/>
-          <p:cNvSpPr txBox="1"/>
-          <p:nvPr/>
-        </p:nvSpPr>
-        <p:spPr>
-          <a:xfrm>
-            <a:off x="9144000" y="3191382"/>
-            <a:ext cx="2641600" cy="1077595"/>
-          </a:xfrm>
-          <a:prstGeom prst="rect">
-            <a:avLst/>
-          </a:prstGeom>
-          <a:ln w="38100">
-            <a:solidFill>
-              <a:srgbClr val="17375E"/>
-            </a:solidFill>
-          </a:ln>
-        </p:spPr>
-        <p:txBody>
-          <a:bodyPr vert="horz" wrap="square" lIns="0" tIns="43815" rIns="0" bIns="0" rtlCol="0">
-            <a:spAutoFit/>
-          </a:bodyPr>
-          <a:lstStyle/>
-          <a:p>
-            <a:pPr marL="229870" marR="93345" indent="-121920">
-              <a:lnSpc>
-                <a:spcPct val="100000"/>
-              </a:lnSpc>
-              <a:spcBef>
-                <a:spcPts val="345"/>
-              </a:spcBef>
-            </a:pPr>
-            <a:r>
-              <a:rPr sz="3200" spc="-10" dirty="0">
-                <a:solidFill>
-                  <a:srgbClr val="17375E"/>
-                </a:solidFill>
-                <a:latin typeface="Verdana"/>
-                <a:cs typeface="Verdana"/>
-              </a:rPr>
-              <a:t>Dispositivos </a:t>
-            </a:r>
-            <a:r>
-              <a:rPr sz="3200" dirty="0">
-                <a:solidFill>
-                  <a:srgbClr val="17375E"/>
-                </a:solidFill>
-                <a:latin typeface="Verdana"/>
-                <a:cs typeface="Verdana"/>
-              </a:rPr>
-              <a:t>PDK</a:t>
-            </a:r>
-            <a:r>
-              <a:rPr sz="3200" spc="-20" dirty="0">
-                <a:solidFill>
-                  <a:srgbClr val="17375E"/>
-                </a:solidFill>
-                <a:latin typeface="Verdana"/>
-                <a:cs typeface="Verdana"/>
-              </a:rPr>
-              <a:t> </a:t>
-            </a:r>
-            <a:r>
-              <a:rPr sz="3200" spc="-10" dirty="0">
-                <a:solidFill>
-                  <a:srgbClr val="17375E"/>
-                </a:solidFill>
-                <a:latin typeface="Verdana"/>
-                <a:cs typeface="Verdana"/>
-              </a:rPr>
-              <a:t>SiePic</a:t>
-            </a:r>
-            <a:endParaRPr sz="3200">
-              <a:latin typeface="Verdana"/>
-              <a:cs typeface="Verdana"/>
-            </a:endParaRPr>
-          </a:p>
-        </p:txBody>
-      </p:sp>
-      <p:pic>
-        <p:nvPicPr>
-          <p:cNvPr id="4" name="object 4"/>
-          <p:cNvPicPr/>
-          <p:nvPr/>
-        </p:nvPicPr>
-        <p:blipFill>
-          <a:blip r:embed="rId2">
-            <a:extLst>
-              <a:ext uri="{28A0092B-C50C-407E-A947-70E740481C1C}">
-                <a14:useLocalDpi xmlns:a14="http://schemas.microsoft.com/office/drawing/2010/main" val="0"/>
-              </a:ext>
-            </a:extLst>
-          </a:blip>
-          <a:srcRect/>
-          <a:stretch/>
-        </p:blipFill>
-        <p:spPr>
-          <a:xfrm>
-            <a:off x="1320783" y="1737027"/>
-            <a:ext cx="6830044" cy="3383945"/>
-          </a:xfrm>
-          <a:prstGeom prst="rect">
-            <a:avLst/>
-          </a:prstGeom>
-        </p:spPr>
-      </p:pic>
-    </p:spTree>
-  </p:cSld>
-  <p:clrMapOvr>
-    <a:masterClrMapping/>
-  </p:clrMapOvr>
-</p:sld>
-</file>
-
-<file path=ppt/slides/slide21.xml><?xml version="1.0" encoding="utf-8"?>
 <p:sld xmlns:a="http://schemas.openxmlformats.org/drawingml/2006/main" xmlns:r="http://schemas.openxmlformats.org/officeDocument/2006/relationships" xmlns:p="http://schemas.openxmlformats.org/presentationml/2006/main">
   <p:cSld>
     <p:spTree>
@@ -7244,6 +7092,36 @@
           </a:p>
         </p:txBody>
       </p:sp>
+      <p:pic>
+        <p:nvPicPr>
+          <p:cNvPr id="8" name="Imagem 7">
+            <a:extLst>
+              <a:ext uri="{FF2B5EF4-FFF2-40B4-BE49-F238E27FC236}">
+                <a16:creationId xmlns:a16="http://schemas.microsoft.com/office/drawing/2014/main" id="{DE9E14CE-9E95-5D66-F843-E5E84B607DCD}"/>
+              </a:ext>
+            </a:extLst>
+          </p:cNvPr>
+          <p:cNvPicPr>
+            <a:picLocks noChangeAspect="1"/>
+          </p:cNvPicPr>
+          <p:nvPr/>
+        </p:nvPicPr>
+        <p:blipFill>
+          <a:blip r:embed="rId5"/>
+          <a:stretch>
+            <a:fillRect/>
+          </a:stretch>
+        </p:blipFill>
+        <p:spPr>
+          <a:xfrm>
+            <a:off x="3810000" y="1066800"/>
+            <a:ext cx="4824000" cy="4961283"/>
+          </a:xfrm>
+          <a:prstGeom prst="rect">
+            <a:avLst/>
+          </a:prstGeom>
+        </p:spPr>
+      </p:pic>
     </p:spTree>
     <p:extLst>
       <p:ext uri="{BB962C8B-B14F-4D97-AF65-F5344CB8AC3E}">

</xml_diff>